<commit_message>
Updated documention for proper program name. switched read me to .md. Create uml diagram and began updateing presentation
</commit_message>
<xml_diff>
--- a/Presentation.pptx
+++ b/Presentation.pptx
@@ -5,7 +5,7 @@
     <p:sldMasterId id="2147483648" r:id="rId1"/>
   </p:sldMasterIdLst>
   <p:notesMasterIdLst>
-    <p:notesMasterId r:id="rId11"/>
+    <p:notesMasterId r:id="rId12"/>
   </p:notesMasterIdLst>
   <p:sldIdLst>
     <p:sldId id="256" r:id="rId2"/>
@@ -16,7 +16,8 @@
     <p:sldId id="258" r:id="rId7"/>
     <p:sldId id="268" r:id="rId8"/>
     <p:sldId id="263" r:id="rId9"/>
-    <p:sldId id="262" r:id="rId10"/>
+    <p:sldId id="270" r:id="rId10"/>
+    <p:sldId id="262" r:id="rId11"/>
   </p:sldIdLst>
   <p:sldSz cx="9144000" cy="6858000" type="screen4x3"/>
   <p:notesSz cx="6858000" cy="9144000"/>
@@ -117,7 +118,7 @@
   </p:defaultTextStyle>
   <p:extLst>
     <p:ext uri="{EFAFB233-063F-42B5-8137-9DF3F51BA10A}">
-      <p15:sldGuideLst xmlns="" xmlns:p15="http://schemas.microsoft.com/office/powerpoint/2012/main">
+      <p15:sldGuideLst xmlns:p15="http://schemas.microsoft.com/office/powerpoint/2012/main" xmlns="">
         <p15:guide id="1" orient="horz" pos="2160">
           <p15:clr>
             <a:srgbClr val="A4A3A4"/>
@@ -217,7 +218,7 @@
             <a:fld id="{B7C85491-E8B0-4F9F-900A-9BCAAC8D7210}" type="datetimeFigureOut">
               <a:rPr lang="en-US" smtClean="0"/>
               <a:pPr/>
-              <a:t>1/24/2017</a:t>
+              <a:t>1/27/2017</a:t>
             </a:fld>
             <a:endParaRPr lang="en-US"/>
           </a:p>
@@ -388,7 +389,7 @@
     </p:spTree>
     <p:extLst>
       <p:ext uri="{BB962C8B-B14F-4D97-AF65-F5344CB8AC3E}">
-        <p14:creationId xmlns="" xmlns:p14="http://schemas.microsoft.com/office/powerpoint/2010/main" val="3294518330"/>
+        <p14:creationId xmlns:p14="http://schemas.microsoft.com/office/powerpoint/2010/main" xmlns="" val="3294518330"/>
       </p:ext>
     </p:extLst>
   </p:cSld>
@@ -565,7 +566,7 @@
     </p:spTree>
     <p:extLst>
       <p:ext uri="{BB962C8B-B14F-4D97-AF65-F5344CB8AC3E}">
-        <p14:creationId xmlns="" xmlns:p14="http://schemas.microsoft.com/office/powerpoint/2010/main" val="2085882507"/>
+        <p14:creationId xmlns:p14="http://schemas.microsoft.com/office/powerpoint/2010/main" xmlns="" val="2085882507"/>
       </p:ext>
     </p:extLst>
   </p:cSld>
@@ -757,7 +758,7 @@
             <a:fld id="{3B1894FC-E103-41F5-BEC1-9C3532091CA7}" type="datetime1">
               <a:rPr lang="en-US" smtClean="0"/>
               <a:pPr/>
-              <a:t>1/24/2017</a:t>
+              <a:t>1/27/2017</a:t>
             </a:fld>
             <a:endParaRPr lang="en-CA"/>
           </a:p>
@@ -924,7 +925,7 @@
             <a:fld id="{31429BB7-F491-4DAE-9AE8-4F585E466CED}" type="datetime1">
               <a:rPr lang="en-US" smtClean="0"/>
               <a:pPr/>
-              <a:t>1/24/2017</a:t>
+              <a:t>1/27/2017</a:t>
             </a:fld>
             <a:endParaRPr lang="en-CA"/>
           </a:p>
@@ -1101,7 +1102,7 @@
             <a:fld id="{B29D62D9-8645-4901-AE86-1D5BE55BF8A5}" type="datetime1">
               <a:rPr lang="en-US" smtClean="0"/>
               <a:pPr/>
-              <a:t>1/24/2017</a:t>
+              <a:t>1/27/2017</a:t>
             </a:fld>
             <a:endParaRPr lang="en-CA"/>
           </a:p>
@@ -1268,7 +1269,7 @@
             <a:fld id="{F80D4BE0-6D42-4AF8-8FC2-85A10C674A42}" type="datetime1">
               <a:rPr lang="en-US" smtClean="0"/>
               <a:pPr/>
-              <a:t>1/24/2017</a:t>
+              <a:t>1/27/2017</a:t>
             </a:fld>
             <a:endParaRPr lang="en-CA"/>
           </a:p>
@@ -1511,7 +1512,7 @@
             <a:fld id="{717764C9-B656-4AB4-915E-031F82D736F1}" type="datetime1">
               <a:rPr lang="en-US" smtClean="0"/>
               <a:pPr/>
-              <a:t>1/24/2017</a:t>
+              <a:t>1/27/2017</a:t>
             </a:fld>
             <a:endParaRPr lang="en-CA"/>
           </a:p>
@@ -1796,7 +1797,7 @@
             <a:fld id="{EDE94880-70CF-4368-AF99-197295159A3D}" type="datetime1">
               <a:rPr lang="en-US" smtClean="0"/>
               <a:pPr/>
-              <a:t>1/24/2017</a:t>
+              <a:t>1/27/2017</a:t>
             </a:fld>
             <a:endParaRPr lang="en-CA"/>
           </a:p>
@@ -2215,7 +2216,7 @@
             <a:fld id="{E62B09E5-D1D7-4170-8307-C1534CDAF4F9}" type="datetime1">
               <a:rPr lang="en-US" smtClean="0"/>
               <a:pPr/>
-              <a:t>1/24/2017</a:t>
+              <a:t>1/27/2017</a:t>
             </a:fld>
             <a:endParaRPr lang="en-CA"/>
           </a:p>
@@ -2330,7 +2331,7 @@
             <a:fld id="{2C1E43BD-402D-48B6-99F1-6B33DC7A8045}" type="datetime1">
               <a:rPr lang="en-US" smtClean="0"/>
               <a:pPr/>
-              <a:t>1/24/2017</a:t>
+              <a:t>1/27/2017</a:t>
             </a:fld>
             <a:endParaRPr lang="en-CA"/>
           </a:p>
@@ -2422,7 +2423,7 @@
             <a:fld id="{59603D66-CAE1-4A28-92EA-E3E198D0192C}" type="datetime1">
               <a:rPr lang="en-US" smtClean="0"/>
               <a:pPr/>
-              <a:t>1/24/2017</a:t>
+              <a:t>1/27/2017</a:t>
             </a:fld>
             <a:endParaRPr lang="en-CA"/>
           </a:p>
@@ -2696,7 +2697,7 @@
             <a:fld id="{08DC18AA-4619-45D8-A70F-CB57C4D13107}" type="datetime1">
               <a:rPr lang="en-US" smtClean="0"/>
               <a:pPr/>
-              <a:t>1/24/2017</a:t>
+              <a:t>1/27/2017</a:t>
             </a:fld>
             <a:endParaRPr lang="en-CA"/>
           </a:p>
@@ -2946,7 +2947,7 @@
             <a:fld id="{64BB3973-35BD-4EAB-BFB8-51566BA65160}" type="datetime1">
               <a:rPr lang="en-US" smtClean="0"/>
               <a:pPr/>
-              <a:t>1/24/2017</a:t>
+              <a:t>1/27/2017</a:t>
             </a:fld>
             <a:endParaRPr lang="en-CA"/>
           </a:p>
@@ -3156,7 +3157,7 @@
             <a:fld id="{5C686656-FAE6-437C-8C68-DBF8B3DDF5A3}" type="datetime1">
               <a:rPr lang="en-US" smtClean="0"/>
               <a:pPr/>
-              <a:t>1/24/2017</a:t>
+              <a:t>1/27/2017</a:t>
             </a:fld>
             <a:endParaRPr lang="en-CA"/>
           </a:p>
@@ -3731,19 +3732,7 @@
           <a:p>
             <a:r>
               <a:rPr lang="en-CA" b="1" dirty="0" smtClean="0"/>
-              <a:t>Ontario Engineering </a:t>
-            </a:r>
-            <a:r>
-              <a:rPr lang="en-CA" b="1" dirty="0" smtClean="0"/>
-              <a:t>Competition </a:t>
-            </a:r>
-            <a:r>
-              <a:rPr lang="en-CA" b="1" dirty="0" smtClean="0"/>
-              <a:t>2017</a:t>
-            </a:r>
-            <a:r>
-              <a:rPr lang="en-CA" b="1" dirty="0" smtClean="0"/>
-              <a:t/>
+              <a:t>Ontario Engineering Competition 2017</a:t>
             </a:r>
             <a:br>
               <a:rPr lang="en-CA" b="1" dirty="0" smtClean="0"/>
@@ -3846,6 +3835,297 @@
               <a:rPr lang="en-CA" smtClean="0"/>
               <a:pPr/>
               <a:t>1</a:t>
+            </a:fld>
+            <a:endParaRPr lang="en-CA" dirty="0"/>
+          </a:p>
+        </p:txBody>
+      </p:sp>
+    </p:spTree>
+  </p:cSld>
+  <p:clrMapOvr>
+    <a:masterClrMapping/>
+  </p:clrMapOvr>
+</p:sld>
+</file>
+
+<file path=ppt/slides/slide10.xml><?xml version="1.0" encoding="utf-8"?>
+<p:sld xmlns:a="http://schemas.openxmlformats.org/drawingml/2006/main" xmlns:r="http://schemas.openxmlformats.org/officeDocument/2006/relationships" xmlns:p="http://schemas.openxmlformats.org/presentationml/2006/main">
+  <p:cSld>
+    <p:bg>
+      <p:bgPr>
+        <a:solidFill>
+          <a:schemeClr val="bg1"/>
+        </a:solidFill>
+        <a:effectLst/>
+      </p:bgPr>
+    </p:bg>
+    <p:spTree>
+      <p:nvGrpSpPr>
+        <p:cNvPr id="1" name=""/>
+        <p:cNvGrpSpPr/>
+        <p:nvPr/>
+      </p:nvGrpSpPr>
+      <p:grpSpPr>
+        <a:xfrm>
+          <a:off x="0" y="0"/>
+          <a:ext cx="0" cy="0"/>
+          <a:chOff x="0" y="0"/>
+          <a:chExt cx="0" cy="0"/>
+        </a:xfrm>
+      </p:grpSpPr>
+      <p:sp>
+        <p:nvSpPr>
+          <p:cNvPr id="5" name="Rectangle 4"/>
+          <p:cNvSpPr/>
+          <p:nvPr/>
+        </p:nvSpPr>
+        <p:spPr>
+          <a:xfrm>
+            <a:off x="2214546" y="6286520"/>
+            <a:ext cx="6786610" cy="285752"/>
+          </a:xfrm>
+          <a:prstGeom prst="rect">
+            <a:avLst/>
+          </a:prstGeom>
+          <a:solidFill>
+            <a:srgbClr val="FF0000">
+              <a:alpha val="90000"/>
+            </a:srgbClr>
+          </a:solidFill>
+          <a:ln>
+            <a:noFill/>
+          </a:ln>
+        </p:spPr>
+        <p:style>
+          <a:lnRef idx="2">
+            <a:schemeClr val="accent1">
+              <a:shade val="50000"/>
+            </a:schemeClr>
+          </a:lnRef>
+          <a:fillRef idx="1">
+            <a:schemeClr val="accent1"/>
+          </a:fillRef>
+          <a:effectRef idx="0">
+            <a:schemeClr val="accent1"/>
+          </a:effectRef>
+          <a:fontRef idx="minor">
+            <a:schemeClr val="lt1"/>
+          </a:fontRef>
+        </p:style>
+        <p:txBody>
+          <a:bodyPr rtlCol="0" anchor="ctr"/>
+          <a:lstStyle/>
+          <a:p>
+            <a:pPr algn="ctr"/>
+            <a:endParaRPr lang="en-CA" dirty="0"/>
+          </a:p>
+        </p:txBody>
+      </p:sp>
+      <p:pic>
+        <p:nvPicPr>
+          <p:cNvPr id="6" name="Picture 5" descr="CarletonLogo.gif"/>
+          <p:cNvPicPr>
+            <a:picLocks noChangeAspect="1"/>
+          </p:cNvPicPr>
+          <p:nvPr/>
+        </p:nvPicPr>
+        <p:blipFill>
+          <a:blip r:embed="rId2" cstate="print"/>
+          <a:stretch>
+            <a:fillRect/>
+          </a:stretch>
+        </p:blipFill>
+        <p:spPr>
+          <a:xfrm>
+            <a:off x="142844" y="6215082"/>
+            <a:ext cx="1940334" cy="500042"/>
+          </a:xfrm>
+          <a:prstGeom prst="rect">
+            <a:avLst/>
+          </a:prstGeom>
+        </p:spPr>
+      </p:pic>
+      <p:sp>
+        <p:nvSpPr>
+          <p:cNvPr id="7" name="Rectangle 6"/>
+          <p:cNvSpPr/>
+          <p:nvPr/>
+        </p:nvSpPr>
+        <p:spPr>
+          <a:xfrm flipV="1">
+            <a:off x="2214546" y="6572272"/>
+            <a:ext cx="6786610" cy="142876"/>
+          </a:xfrm>
+          <a:prstGeom prst="rect">
+            <a:avLst/>
+          </a:prstGeom>
+          <a:solidFill>
+            <a:schemeClr val="tx1"/>
+          </a:solidFill>
+          <a:ln>
+            <a:noFill/>
+          </a:ln>
+        </p:spPr>
+        <p:style>
+          <a:lnRef idx="2">
+            <a:schemeClr val="accent1">
+              <a:shade val="50000"/>
+            </a:schemeClr>
+          </a:lnRef>
+          <a:fillRef idx="1">
+            <a:schemeClr val="accent1"/>
+          </a:fillRef>
+          <a:effectRef idx="0">
+            <a:schemeClr val="accent1"/>
+          </a:effectRef>
+          <a:fontRef idx="minor">
+            <a:schemeClr val="lt1"/>
+          </a:fontRef>
+        </p:style>
+        <p:txBody>
+          <a:bodyPr rtlCol="0" anchor="ctr"/>
+          <a:lstStyle/>
+          <a:p>
+            <a:pPr algn="ctr"/>
+            <a:endParaRPr lang="en-CA"/>
+          </a:p>
+        </p:txBody>
+      </p:sp>
+      <p:sp>
+        <p:nvSpPr>
+          <p:cNvPr id="10" name="Title 9"/>
+          <p:cNvSpPr>
+            <a:spLocks noGrp="1"/>
+          </p:cNvSpPr>
+          <p:nvPr>
+            <p:ph type="title"/>
+          </p:nvPr>
+        </p:nvSpPr>
+        <p:spPr/>
+        <p:txBody>
+          <a:bodyPr/>
+          <a:lstStyle/>
+          <a:p>
+            <a:r>
+              <a:rPr lang="en-CA" b="1" dirty="0" smtClean="0"/>
+              <a:t>Next Steps / Future Goals</a:t>
+            </a:r>
+            <a:endParaRPr lang="en-CA" b="1" dirty="0"/>
+          </a:p>
+        </p:txBody>
+      </p:sp>
+      <p:sp>
+        <p:nvSpPr>
+          <p:cNvPr id="11" name="Content Placeholder 10"/>
+          <p:cNvSpPr>
+            <a:spLocks noGrp="1"/>
+          </p:cNvSpPr>
+          <p:nvPr>
+            <p:ph idx="1"/>
+          </p:nvPr>
+        </p:nvSpPr>
+        <p:spPr/>
+        <p:txBody>
+          <a:bodyPr/>
+          <a:lstStyle/>
+          <a:p>
+            <a:r>
+              <a:rPr lang="en-CA" dirty="0" smtClean="0"/>
+              <a:t>Add ability to manually edit more fields</a:t>
+            </a:r>
+          </a:p>
+          <a:p>
+            <a:endParaRPr lang="en-CA" dirty="0" smtClean="0"/>
+          </a:p>
+          <a:p>
+            <a:r>
+              <a:rPr lang="en-CA" dirty="0" smtClean="0"/>
+              <a:t>Add searching and sorting of fields</a:t>
+            </a:r>
+          </a:p>
+          <a:p>
+            <a:endParaRPr lang="en-CA" dirty="0" smtClean="0"/>
+          </a:p>
+          <a:p>
+            <a:r>
+              <a:rPr lang="en-CA" dirty="0" smtClean="0"/>
+              <a:t>Improve on scheduling algorithms</a:t>
+            </a:r>
+          </a:p>
+          <a:p>
+            <a:endParaRPr lang="en-CA" dirty="0" smtClean="0"/>
+          </a:p>
+          <a:p>
+            <a:endParaRPr lang="en-CA" dirty="0" smtClean="0"/>
+          </a:p>
+        </p:txBody>
+      </p:sp>
+      <p:cxnSp>
+        <p:nvCxnSpPr>
+          <p:cNvPr id="12" name="Straight Connector 11"/>
+          <p:cNvCxnSpPr/>
+          <p:nvPr/>
+        </p:nvCxnSpPr>
+        <p:spPr>
+          <a:xfrm>
+            <a:off x="2214546" y="6572272"/>
+            <a:ext cx="6786610" cy="1588"/>
+          </a:xfrm>
+          <a:prstGeom prst="line">
+            <a:avLst/>
+          </a:prstGeom>
+          <a:ln w="12700">
+            <a:solidFill>
+              <a:schemeClr val="bg1"/>
+            </a:solidFill>
+          </a:ln>
+          <a:effectLst>
+            <a:outerShdw blurRad="88900" sx="102000" sy="102000" algn="ctr" rotWithShape="0">
+              <a:schemeClr val="bg1">
+                <a:alpha val="61000"/>
+              </a:schemeClr>
+            </a:outerShdw>
+          </a:effectLst>
+        </p:spPr>
+        <p:style>
+          <a:lnRef idx="1">
+            <a:schemeClr val="accent1"/>
+          </a:lnRef>
+          <a:fillRef idx="0">
+            <a:schemeClr val="accent1"/>
+          </a:fillRef>
+          <a:effectRef idx="0">
+            <a:schemeClr val="accent1"/>
+          </a:effectRef>
+          <a:fontRef idx="minor">
+            <a:schemeClr val="tx1"/>
+          </a:fontRef>
+        </p:style>
+      </p:cxnSp>
+      <p:sp>
+        <p:nvSpPr>
+          <p:cNvPr id="16" name="Slide Number Placeholder 15"/>
+          <p:cNvSpPr>
+            <a:spLocks noGrp="1"/>
+          </p:cNvSpPr>
+          <p:nvPr>
+            <p:ph type="sldNum" sz="quarter" idx="12"/>
+          </p:nvPr>
+        </p:nvSpPr>
+        <p:spPr>
+          <a:xfrm>
+            <a:off x="6553200" y="6286520"/>
+            <a:ext cx="2133600" cy="365125"/>
+          </a:xfrm>
+        </p:spPr>
+        <p:txBody>
+          <a:bodyPr/>
+          <a:lstStyle/>
+          <a:p>
+            <a:fld id="{3E1D218B-D0C8-4B57-A33A-A84CB916D2FC}" type="slidenum">
+              <a:rPr lang="en-CA" smtClean="0"/>
+              <a:pPr/>
+              <a:t>10</a:t>
             </a:fld>
             <a:endParaRPr lang="en-CA" dirty="0"/>
           </a:p>
@@ -4044,7 +4324,15 @@
           <a:p>
             <a:r>
               <a:rPr lang="en-CA" dirty="0" smtClean="0"/>
-              <a:t>Create easy to use, autonomous management system</a:t>
+              <a:t>Create easy to use, </a:t>
+            </a:r>
+            <a:r>
+              <a:rPr lang="en-CA" dirty="0" smtClean="0"/>
+              <a:t>autonomous power management and control </a:t>
+            </a:r>
+            <a:r>
+              <a:rPr lang="en-CA" dirty="0" smtClean="0"/>
+              <a:t>system</a:t>
             </a:r>
           </a:p>
           <a:p>
@@ -4053,7 +4341,7 @@
           <a:p>
             <a:r>
               <a:rPr lang="en-CA" dirty="0" smtClean="0"/>
-              <a:t>Manage both products and volunteers</a:t>
+              <a:t>Handle power outages and interruptions</a:t>
             </a:r>
           </a:p>
           <a:p>
@@ -4062,16 +4350,9 @@
           <a:p>
             <a:r>
               <a:rPr lang="en-CA" dirty="0" smtClean="0"/>
-              <a:t>Import data from existing </a:t>
-            </a:r>
-            <a:r>
-              <a:rPr lang="en-CA" dirty="0" err="1" smtClean="0"/>
-              <a:t>docx</a:t>
-            </a:r>
-            <a:r>
-              <a:rPr lang="en-CA" dirty="0" smtClean="0"/>
-              <a:t> files</a:t>
-            </a:r>
+              <a:t>Maximize profit and ensure quality services</a:t>
+            </a:r>
+            <a:endParaRPr lang="en-CA" dirty="0" smtClean="0"/>
           </a:p>
           <a:p>
             <a:endParaRPr lang="en-CA" dirty="0" smtClean="0"/>
@@ -4190,29 +4471,6 @@
           <a:chExt cx="0" cy="0"/>
         </a:xfrm>
       </p:grpSpPr>
-      <p:pic>
-        <p:nvPicPr>
-          <p:cNvPr id="5" name="Content Placeholder 4" descr="14102651_626210194208163_7391684745518559029_n.png"/>
-          <p:cNvPicPr>
-            <a:picLocks noGrp="1" noChangeAspect="1"/>
-          </p:cNvPicPr>
-          <p:nvPr>
-            <p:ph idx="1"/>
-          </p:nvPr>
-        </p:nvPicPr>
-        <p:blipFill>
-          <a:blip r:embed="rId2" cstate="print"/>
-          <a:stretch>
-            <a:fillRect/>
-          </a:stretch>
-        </p:blipFill>
-        <p:spPr>
-          <a:xfrm>
-            <a:off x="827584" y="188640"/>
-            <a:ext cx="7560840" cy="7560840"/>
-          </a:xfrm>
-        </p:spPr>
-      </p:pic>
       <p:sp>
         <p:nvSpPr>
           <p:cNvPr id="2" name="Title 1"/>
@@ -4225,14 +4483,16 @@
         </p:nvSpPr>
         <p:spPr/>
         <p:txBody>
-          <a:bodyPr/>
+          <a:bodyPr>
+            <a:normAutofit fontScale="90000"/>
+          </a:bodyPr>
           <a:lstStyle/>
           <a:p>
             <a:r>
               <a:rPr lang="en-US" b="1" i="1" dirty="0" smtClean="0">
                 <a:latin typeface="Constantia" pitchFamily="18" charset="0"/>
               </a:rPr>
-              <a:t>SS Leos Management System</a:t>
+              <a:t>GPC Power Monitoring and Control System</a:t>
             </a:r>
             <a:endParaRPr lang="en-US" b="1" i="1" dirty="0">
               <a:latin typeface="Constantia" pitchFamily="18" charset="0"/>
@@ -4261,6 +4521,25 @@
               <a:t>3</a:t>
             </a:fld>
             <a:endParaRPr lang="en-CA"/>
+          </a:p>
+        </p:txBody>
+      </p:sp>
+      <p:sp>
+        <p:nvSpPr>
+          <p:cNvPr id="6" name="Content Placeholder 5"/>
+          <p:cNvSpPr>
+            <a:spLocks noGrp="1"/>
+          </p:cNvSpPr>
+          <p:nvPr>
+            <p:ph idx="1"/>
+          </p:nvPr>
+        </p:nvSpPr>
+        <p:spPr/>
+        <p:txBody>
+          <a:bodyPr/>
+          <a:lstStyle/>
+          <a:p>
+            <a:endParaRPr lang="en-US"/>
           </a:p>
         </p:txBody>
       </p:sp>
@@ -4480,17 +4759,18 @@
           </a:p>
           <a:p>
             <a:r>
+              <a:rPr lang="en-CA" dirty="0" err="1" smtClean="0"/>
+              <a:t>D</a:t>
+            </a:r>
+            <a:r>
+              <a:rPr lang="en-CA" dirty="0" err="1" smtClean="0"/>
+              <a:t>ijkstra's</a:t>
+            </a:r>
+            <a:r>
               <a:rPr lang="en-CA" dirty="0" smtClean="0"/>
-              <a:t>Import from user friendly .</a:t>
-            </a:r>
-            <a:r>
-              <a:rPr lang="en-CA" dirty="0" err="1" smtClean="0"/>
-              <a:t>docx</a:t>
-            </a:r>
-            <a:r>
-              <a:rPr lang="en-CA" dirty="0" smtClean="0"/>
-              <a:t> files</a:t>
-            </a:r>
+              <a:t> based path finding</a:t>
+            </a:r>
+            <a:endParaRPr lang="en-CA" dirty="0" smtClean="0"/>
           </a:p>
           <a:p>
             <a:endParaRPr lang="en-CA" dirty="0"/>
@@ -5104,8 +5384,9 @@
           <a:p>
             <a:r>
               <a:rPr lang="en-CA" dirty="0" smtClean="0"/>
-              <a:t>Organization of database</a:t>
-            </a:r>
+              <a:t>Deciding on path finding algorithm</a:t>
+            </a:r>
+            <a:endParaRPr lang="en-CA" dirty="0" smtClean="0"/>
           </a:p>
         </p:txBody>
       </p:sp>
@@ -5372,8 +5653,9 @@
           <a:p>
             <a:r>
               <a:rPr lang="en-CA" dirty="0" smtClean="0"/>
-              <a:t>What do managers want to see?</a:t>
-            </a:r>
+              <a:t>How to represent the nodes in the system?</a:t>
+            </a:r>
+            <a:endParaRPr lang="en-CA" dirty="0" smtClean="0"/>
           </a:p>
           <a:p>
             <a:pPr lvl="1"/>
@@ -5769,14 +6051,6 @@
 <file path=ppt/slides/slide9.xml><?xml version="1.0" encoding="utf-8"?>
 <p:sld xmlns:a="http://schemas.openxmlformats.org/drawingml/2006/main" xmlns:r="http://schemas.openxmlformats.org/officeDocument/2006/relationships" xmlns:p="http://schemas.openxmlformats.org/presentationml/2006/main">
   <p:cSld>
-    <p:bg>
-      <p:bgPr>
-        <a:solidFill>
-          <a:schemeClr val="bg1"/>
-        </a:solidFill>
-        <a:effectLst/>
-      </p:bgPr>
-    </p:bg>
     <p:spTree>
       <p:nvGrpSpPr>
         <p:cNvPr id="1" name=""/>
@@ -5835,7 +6109,7 @@
           <a:lstStyle/>
           <a:p>
             <a:pPr algn="ctr"/>
-            <a:endParaRPr lang="en-CA" dirty="0"/>
+            <a:endParaRPr lang="en-CA"/>
           </a:p>
         </p:txBody>
       </p:sp>
@@ -5926,7 +6200,7 @@
           <a:p>
             <a:r>
               <a:rPr lang="en-CA" b="1" dirty="0" smtClean="0"/>
-              <a:t>Next Steps / Future Goals</a:t>
+              <a:t>Documentation</a:t>
             </a:r>
             <a:endParaRPr lang="en-CA" b="1" dirty="0"/>
           </a:p>
@@ -5949,7 +6223,7 @@
           <a:p>
             <a:r>
               <a:rPr lang="en-CA" dirty="0" smtClean="0"/>
-              <a:t>Add ability to manually edit more fields</a:t>
+              <a:t>Developer README</a:t>
             </a:r>
           </a:p>
           <a:p>
@@ -5958,7 +6232,7 @@
           <a:p>
             <a:r>
               <a:rPr lang="en-CA" dirty="0" smtClean="0"/>
-              <a:t>Add searching and sorting of fields</a:t>
+              <a:t>User Manual</a:t>
             </a:r>
           </a:p>
           <a:p>
@@ -5966,11 +6240,9 @@
           </a:p>
           <a:p>
             <a:r>
-              <a:rPr lang="en-CA" dirty="0" smtClean="0"/>
-              <a:t>Improve on scheduling algorithms</a:t>
-            </a:r>
-          </a:p>
-          <a:p>
+              <a:rPr lang="en-CA" smtClean="0"/>
+              <a:t>UML Diagrams</a:t>
+            </a:r>
             <a:endParaRPr lang="en-CA" dirty="0" smtClean="0"/>
           </a:p>
           <a:p>
@@ -6022,7 +6294,7 @@
       </p:cxnSp>
       <p:sp>
         <p:nvSpPr>
-          <p:cNvPr id="16" name="Slide Number Placeholder 15"/>
+          <p:cNvPr id="9" name="Slide Number Placeholder 8"/>
           <p:cNvSpPr>
             <a:spLocks noGrp="1"/>
           </p:cNvSpPr>

</xml_diff>

<commit_message>
updates to documentation about Dijkstra's algorithm
</commit_message>
<xml_diff>
--- a/Presentation.pptx
+++ b/Presentation.pptx
@@ -4360,8 +4360,9 @@
           <a:p>
             <a:r>
               <a:rPr lang="en-CA" dirty="0" smtClean="0"/>
-              <a:t>Notify managers when to order new stock</a:t>
-            </a:r>
+              <a:t>Provide all information graphically</a:t>
+            </a:r>
+            <a:endParaRPr lang="en-CA" dirty="0" smtClean="0"/>
           </a:p>
           <a:p>
             <a:endParaRPr lang="en-CA" dirty="0"/>
@@ -4735,23 +4736,33 @@
           <a:p>
             <a:r>
               <a:rPr lang="en-CA" dirty="0" smtClean="0"/>
-              <a:t>Simple and batch-specific views</a:t>
-            </a:r>
-          </a:p>
-          <a:p>
+              <a:t>Entire grid view</a:t>
+            </a:r>
             <a:endParaRPr lang="en-CA" dirty="0" smtClean="0"/>
           </a:p>
           <a:p>
+            <a:endParaRPr lang="en-CA" dirty="0" smtClean="0"/>
+          </a:p>
+          <a:p>
             <a:r>
               <a:rPr lang="en-CA" dirty="0" smtClean="0"/>
-              <a:t>Manager set re-stock limit</a:t>
-            </a:r>
+              <a:t>Dynamic path calculation</a:t>
+            </a:r>
+            <a:endParaRPr lang="en-CA" dirty="0" smtClean="0"/>
           </a:p>
           <a:p>
             <a:pPr lvl="1"/>
             <a:r>
+              <a:rPr lang="en-CA" dirty="0" err="1" smtClean="0"/>
+              <a:t>Dijkstra's</a:t>
+            </a:r>
+            <a:r>
               <a:rPr lang="en-CA" dirty="0" smtClean="0"/>
-              <a:t>Notification system when below limit</a:t>
+              <a:t> Algorithm </a:t>
+            </a:r>
+            <a:r>
+              <a:rPr lang="en-CA" dirty="0" smtClean="0"/>
+              <a:t>based path finding</a:t>
             </a:r>
           </a:p>
           <a:p>
@@ -4759,34 +4770,18 @@
           </a:p>
           <a:p>
             <a:r>
-              <a:rPr lang="en-CA" dirty="0" err="1" smtClean="0"/>
-              <a:t>D</a:t>
-            </a:r>
-            <a:r>
-              <a:rPr lang="en-CA" dirty="0" err="1" smtClean="0"/>
-              <a:t>ijkstra's</a:t>
-            </a:r>
-            <a:r>
               <a:rPr lang="en-CA" dirty="0" smtClean="0"/>
-              <a:t> based path finding</a:t>
-            </a:r>
+              <a:t>Individual node power information</a:t>
+            </a:r>
+          </a:p>
+          <a:p>
             <a:endParaRPr lang="en-CA" dirty="0" smtClean="0"/>
           </a:p>
           <a:p>
-            <a:endParaRPr lang="en-CA" dirty="0"/>
-          </a:p>
-          <a:p>
             <a:r>
               <a:rPr lang="en-CA" dirty="0" smtClean="0"/>
-              <a:t>Export to .</a:t>
-            </a:r>
-            <a:r>
-              <a:rPr lang="en-CA" dirty="0" err="1" smtClean="0"/>
-              <a:t>csv</a:t>
-            </a:r>
-            <a:endParaRPr lang="en-CA" dirty="0" smtClean="0"/>
-          </a:p>
-          <a:p>
+              <a:t>Something else</a:t>
+            </a:r>
             <a:endParaRPr lang="en-CA" dirty="0" smtClean="0"/>
           </a:p>
           <a:p>
@@ -6240,7 +6235,7 @@
           </a:p>
           <a:p>
             <a:r>
-              <a:rPr lang="en-CA" smtClean="0"/>
+              <a:rPr lang="en-CA" dirty="0" smtClean="0"/>
               <a:t>UML Diagrams</a:t>
             </a:r>
             <a:endParaRPr lang="en-CA" dirty="0" smtClean="0"/>

</xml_diff>

<commit_message>
small updates to presentation and refactored pathFinder class
</commit_message>
<xml_diff>
--- a/Presentation.pptx
+++ b/Presentation.pptx
@@ -4031,8 +4031,9 @@
           <a:p>
             <a:r>
               <a:rPr lang="en-CA" dirty="0" smtClean="0"/>
-              <a:t>Add ability to manually edit more fields</a:t>
-            </a:r>
+              <a:t>Improve flexibility of grid layout</a:t>
+            </a:r>
+            <a:endParaRPr lang="en-CA" dirty="0" smtClean="0"/>
           </a:p>
           <a:p>
             <a:endParaRPr lang="en-CA" dirty="0" smtClean="0"/>
@@ -4049,8 +4050,13 @@
           <a:p>
             <a:r>
               <a:rPr lang="en-CA" dirty="0" smtClean="0"/>
-              <a:t>Improve on scheduling algorithms</a:t>
-            </a:r>
+              <a:t>Improve </a:t>
+            </a:r>
+            <a:r>
+              <a:rPr lang="en-CA" dirty="0" smtClean="0"/>
+              <a:t>path finding algorithm</a:t>
+            </a:r>
+            <a:endParaRPr lang="en-CA" dirty="0" smtClean="0"/>
           </a:p>
           <a:p>
             <a:endParaRPr lang="en-CA" dirty="0" smtClean="0"/>
@@ -5067,7 +5073,15 @@
           <a:p>
             <a:r>
               <a:rPr lang="en-CA" dirty="0" smtClean="0"/>
-              <a:t>User friendly, simple intuitive design</a:t>
+              <a:t>User friendly, </a:t>
+            </a:r>
+            <a:r>
+              <a:rPr lang="en-CA" dirty="0" smtClean="0"/>
+              <a:t>simple, </a:t>
+            </a:r>
+            <a:r>
+              <a:rPr lang="en-CA" dirty="0" smtClean="0"/>
+              <a:t>intuitive design</a:t>
             </a:r>
           </a:p>
           <a:p>

</xml_diff>

<commit_message>
Fixed typos, added toStrings
</commit_message>
<xml_diff>
--- a/Presentation.pptx
+++ b/Presentation.pptx
@@ -118,7 +118,7 @@
   </p:defaultTextStyle>
   <p:extLst>
     <p:ext uri="{EFAFB233-063F-42B5-8137-9DF3F51BA10A}">
-      <p15:sldGuideLst xmlns:p15="http://schemas.microsoft.com/office/powerpoint/2012/main" xmlns="">
+      <p15:sldGuideLst xmlns:p15="http://schemas.microsoft.com/office/powerpoint/2012/main">
         <p15:guide id="1" orient="horz" pos="2160">
           <p15:clr>
             <a:srgbClr val="A4A3A4"/>
@@ -389,7 +389,7 @@
     </p:spTree>
     <p:extLst>
       <p:ext uri="{BB962C8B-B14F-4D97-AF65-F5344CB8AC3E}">
-        <p14:creationId xmlns:p14="http://schemas.microsoft.com/office/powerpoint/2010/main" xmlns="" val="3294518330"/>
+        <p14:creationId xmlns:p14="http://schemas.microsoft.com/office/powerpoint/2010/main" val="3294518330"/>
       </p:ext>
     </p:extLst>
   </p:cSld>
@@ -566,7 +566,7 @@
     </p:spTree>
     <p:extLst>
       <p:ext uri="{BB962C8B-B14F-4D97-AF65-F5344CB8AC3E}">
-        <p14:creationId xmlns:p14="http://schemas.microsoft.com/office/powerpoint/2010/main" xmlns="" val="2085882507"/>
+        <p14:creationId xmlns:p14="http://schemas.microsoft.com/office/powerpoint/2010/main" val="2085882507"/>
       </p:ext>
     </p:extLst>
   </p:cSld>
@@ -4031,34 +4031,31 @@
           <a:p>
             <a:r>
               <a:rPr lang="en-CA" dirty="0" smtClean="0"/>
-              <a:t>Improve flexibility of grid layout</a:t>
-            </a:r>
+              <a:t>Improve flexibility </a:t>
+            </a:r>
+            <a:r>
+              <a:rPr lang="en-CA" dirty="0" smtClean="0"/>
+              <a:t>of visual </a:t>
+            </a:r>
+            <a:r>
+              <a:rPr lang="en-CA" dirty="0" smtClean="0"/>
+              <a:t>grid </a:t>
+            </a:r>
+            <a:r>
+              <a:rPr lang="en-CA" dirty="0" smtClean="0"/>
+              <a:t>layout</a:t>
+            </a:r>
+          </a:p>
+          <a:p>
+            <a:endParaRPr lang="en-CA" dirty="0"/>
+          </a:p>
+          <a:p>
             <a:endParaRPr lang="en-CA" dirty="0" smtClean="0"/>
           </a:p>
           <a:p>
-            <a:endParaRPr lang="en-CA" dirty="0" smtClean="0"/>
-          </a:p>
-          <a:p>
-            <a:r>
-              <a:rPr lang="en-CA" dirty="0" smtClean="0"/>
-              <a:t>Add searching and sorting of fields</a:t>
-            </a:r>
-          </a:p>
-          <a:p>
-            <a:endParaRPr lang="en-CA" dirty="0" smtClean="0"/>
-          </a:p>
-          <a:p>
-            <a:r>
-              <a:rPr lang="en-CA" dirty="0" smtClean="0"/>
-              <a:t>Improve </a:t>
-            </a:r>
-            <a:r>
-              <a:rPr lang="en-CA" dirty="0" smtClean="0"/>
-              <a:t>path finding algorithm</a:t>
-            </a:r>
-            <a:endParaRPr lang="en-CA" dirty="0" smtClean="0"/>
-          </a:p>
-          <a:p>
+            <a:pPr marL="0" indent="0">
+              <a:buNone/>
+            </a:pPr>
             <a:endParaRPr lang="en-CA" dirty="0" smtClean="0"/>
           </a:p>
           <a:p>
@@ -4330,15 +4327,7 @@
           <a:p>
             <a:r>
               <a:rPr lang="en-CA" dirty="0" smtClean="0"/>
-              <a:t>Create easy to use, </a:t>
-            </a:r>
-            <a:r>
-              <a:rPr lang="en-CA" dirty="0" smtClean="0"/>
-              <a:t>autonomous power management and control </a:t>
-            </a:r>
-            <a:r>
-              <a:rPr lang="en-CA" dirty="0" smtClean="0"/>
-              <a:t>system</a:t>
+              <a:t>Create easy to use, autonomous power management and control system</a:t>
             </a:r>
           </a:p>
           <a:p>
@@ -4356,9 +4345,12 @@
           <a:p>
             <a:r>
               <a:rPr lang="en-CA" dirty="0" smtClean="0"/>
-              <a:t>Maximize profit and ensure quality services</a:t>
-            </a:r>
-            <a:endParaRPr lang="en-CA" dirty="0" smtClean="0"/>
+              <a:t>Minimize costs and </a:t>
+            </a:r>
+            <a:r>
+              <a:rPr lang="en-CA" dirty="0" smtClean="0"/>
+              <a:t>ensure quality services</a:t>
+            </a:r>
           </a:p>
           <a:p>
             <a:endParaRPr lang="en-CA" dirty="0" smtClean="0"/>
@@ -4368,7 +4360,6 @@
               <a:rPr lang="en-CA" dirty="0" smtClean="0"/>
               <a:t>Provide all information graphically</a:t>
             </a:r>
-            <a:endParaRPr lang="en-CA" dirty="0" smtClean="0"/>
           </a:p>
           <a:p>
             <a:endParaRPr lang="en-CA" dirty="0"/>
@@ -4736,13 +4727,17 @@
         <p:spPr/>
         <p:txBody>
           <a:bodyPr>
-            <a:normAutofit lnSpcReduction="10000"/>
+            <a:normAutofit/>
           </a:bodyPr>
           <a:lstStyle/>
           <a:p>
             <a:r>
               <a:rPr lang="en-CA" dirty="0" smtClean="0"/>
-              <a:t>Entire grid view</a:t>
+              <a:t>Entire grid </a:t>
+            </a:r>
+            <a:r>
+              <a:rPr lang="en-CA" dirty="0" smtClean="0"/>
+              <a:t>view, zoom feature</a:t>
             </a:r>
             <a:endParaRPr lang="en-CA" dirty="0" smtClean="0"/>
           </a:p>
@@ -4754,40 +4749,34 @@
               <a:rPr lang="en-CA" dirty="0" smtClean="0"/>
               <a:t>Dynamic path calculation</a:t>
             </a:r>
+          </a:p>
+          <a:p>
+            <a:pPr lvl="1"/>
+            <a:r>
+              <a:rPr lang="en-CA" dirty="0" smtClean="0"/>
+              <a:t>Dijkstra's Algorithm </a:t>
+            </a:r>
+            <a:r>
+              <a:rPr lang="en-CA" dirty="0" smtClean="0"/>
+              <a:t>for optimal path finding</a:t>
+            </a:r>
             <a:endParaRPr lang="en-CA" dirty="0" smtClean="0"/>
           </a:p>
           <a:p>
-            <a:pPr lvl="1"/>
-            <a:r>
-              <a:rPr lang="en-CA" dirty="0" err="1" smtClean="0"/>
-              <a:t>Dijkstra's</a:t>
-            </a:r>
+            <a:endParaRPr lang="en-CA" dirty="0" smtClean="0"/>
+          </a:p>
+          <a:p>
             <a:r>
               <a:rPr lang="en-CA" dirty="0" smtClean="0"/>
-              <a:t> Algorithm </a:t>
+              <a:t>Individual node </a:t>
             </a:r>
             <a:r>
               <a:rPr lang="en-CA" dirty="0" smtClean="0"/>
-              <a:t>based path finding</a:t>
-            </a:r>
-          </a:p>
-          <a:p>
+              <a:t>observations and metrics</a:t>
+            </a:r>
             <a:endParaRPr lang="en-CA" dirty="0" smtClean="0"/>
           </a:p>
           <a:p>
-            <a:r>
-              <a:rPr lang="en-CA" dirty="0" smtClean="0"/>
-              <a:t>Individual node power information</a:t>
-            </a:r>
-          </a:p>
-          <a:p>
-            <a:endParaRPr lang="en-CA" dirty="0" smtClean="0"/>
-          </a:p>
-          <a:p>
-            <a:r>
-              <a:rPr lang="en-CA" dirty="0" smtClean="0"/>
-              <a:t>Something else</a:t>
-            </a:r>
             <a:endParaRPr lang="en-CA" dirty="0" smtClean="0"/>
           </a:p>
           <a:p>
@@ -5073,15 +5062,7 @@
           <a:p>
             <a:r>
               <a:rPr lang="en-CA" dirty="0" smtClean="0"/>
-              <a:t>User friendly, </a:t>
-            </a:r>
-            <a:r>
-              <a:rPr lang="en-CA" dirty="0" smtClean="0"/>
-              <a:t>simple, </a:t>
-            </a:r>
-            <a:r>
-              <a:rPr lang="en-CA" dirty="0" smtClean="0"/>
-              <a:t>intuitive design</a:t>
+              <a:t>User friendly, simple, intuitive design</a:t>
             </a:r>
           </a:p>
           <a:p>
@@ -5395,7 +5376,6 @@
               <a:rPr lang="en-CA" dirty="0" smtClean="0"/>
               <a:t>Deciding on path finding algorithm</a:t>
             </a:r>
-            <a:endParaRPr lang="en-CA" dirty="0" smtClean="0"/>
           </a:p>
         </p:txBody>
       </p:sp>
@@ -5662,16 +5642,13 @@
           <a:p>
             <a:r>
               <a:rPr lang="en-CA" dirty="0" smtClean="0"/>
-              <a:t>How to represent the nodes in the system?</a:t>
+              <a:t>How to </a:t>
+            </a:r>
+            <a:r>
+              <a:rPr lang="en-CA" dirty="0" smtClean="0"/>
+              <a:t>implement connections?</a:t>
             </a:r>
             <a:endParaRPr lang="en-CA" dirty="0" smtClean="0"/>
-          </a:p>
-          <a:p>
-            <a:pPr lvl="1"/>
-            <a:r>
-              <a:rPr lang="en-CA" dirty="0" smtClean="0"/>
-              <a:t>Important information up front, details when asked</a:t>
-            </a:r>
           </a:p>
           <a:p>
             <a:endParaRPr lang="en-CA" dirty="0" smtClean="0"/>
@@ -5970,8 +5947,21 @@
           <a:p>
             <a:r>
               <a:rPr lang="en-CA" dirty="0" smtClean="0"/>
-              <a:t>Quick, regular team meetings to discuss major obstacles and progress</a:t>
-            </a:r>
+              <a:t>Quick, </a:t>
+            </a:r>
+            <a:r>
+              <a:rPr lang="en-CA" dirty="0" smtClean="0"/>
+              <a:t>AGILE </a:t>
+            </a:r>
+            <a:r>
+              <a:rPr lang="en-CA" dirty="0" smtClean="0"/>
+              <a:t>team meetings to </a:t>
+            </a:r>
+            <a:r>
+              <a:rPr lang="en-CA" dirty="0" smtClean="0"/>
+              <a:t>discuss progress and obstacles</a:t>
+            </a:r>
+            <a:endParaRPr lang="en-CA" dirty="0" smtClean="0"/>
           </a:p>
           <a:p>
             <a:endParaRPr lang="en-CA" dirty="0" smtClean="0"/>
@@ -6252,7 +6242,6 @@
               <a:rPr lang="en-CA" dirty="0" smtClean="0"/>
               <a:t>UML Diagrams</a:t>
             </a:r>
-            <a:endParaRPr lang="en-CA" dirty="0" smtClean="0"/>
           </a:p>
           <a:p>
             <a:endParaRPr lang="en-CA" dirty="0" smtClean="0"/>

</xml_diff>